<commit_message>
add files for class
</commit_message>
<xml_diff>
--- a/4. Data exploration/Data_exploration.pptx
+++ b/4. Data exploration/Data_exploration.pptx
@@ -245,7 +245,7 @@
           <a:p>
             <a:fld id="{5D7A1F8C-62F5-5C43-8A5F-0B140731EF0C}" type="datetimeFigureOut">
               <a:rPr lang="en-US" smtClean="0"/>
-              <a:t>10/15/19</a:t>
+              <a:t>10/11/21</a:t>
             </a:fld>
             <a:endParaRPr lang="en-US"/>
           </a:p>
@@ -413,7 +413,7 @@
           <a:p>
             <a:fld id="{5D7A1F8C-62F5-5C43-8A5F-0B140731EF0C}" type="datetimeFigureOut">
               <a:rPr lang="en-US" smtClean="0"/>
-              <a:t>10/15/19</a:t>
+              <a:t>10/11/21</a:t>
             </a:fld>
             <a:endParaRPr lang="en-US"/>
           </a:p>
@@ -591,7 +591,7 @@
           <a:p>
             <a:fld id="{5D7A1F8C-62F5-5C43-8A5F-0B140731EF0C}" type="datetimeFigureOut">
               <a:rPr lang="en-US" smtClean="0"/>
-              <a:t>10/15/19</a:t>
+              <a:t>10/11/21</a:t>
             </a:fld>
             <a:endParaRPr lang="en-US"/>
           </a:p>
@@ -759,7 +759,7 @@
           <a:p>
             <a:fld id="{5D7A1F8C-62F5-5C43-8A5F-0B140731EF0C}" type="datetimeFigureOut">
               <a:rPr lang="en-US" smtClean="0"/>
-              <a:t>10/15/19</a:t>
+              <a:t>10/11/21</a:t>
             </a:fld>
             <a:endParaRPr lang="en-US"/>
           </a:p>
@@ -1004,7 +1004,7 @@
           <a:p>
             <a:fld id="{5D7A1F8C-62F5-5C43-8A5F-0B140731EF0C}" type="datetimeFigureOut">
               <a:rPr lang="en-US" smtClean="0"/>
-              <a:t>10/15/19</a:t>
+              <a:t>10/11/21</a:t>
             </a:fld>
             <a:endParaRPr lang="en-US"/>
           </a:p>
@@ -1233,7 +1233,7 @@
           <a:p>
             <a:fld id="{5D7A1F8C-62F5-5C43-8A5F-0B140731EF0C}" type="datetimeFigureOut">
               <a:rPr lang="en-US" smtClean="0"/>
-              <a:t>10/15/19</a:t>
+              <a:t>10/11/21</a:t>
             </a:fld>
             <a:endParaRPr lang="en-US"/>
           </a:p>
@@ -1597,7 +1597,7 @@
           <a:p>
             <a:fld id="{5D7A1F8C-62F5-5C43-8A5F-0B140731EF0C}" type="datetimeFigureOut">
               <a:rPr lang="en-US" smtClean="0"/>
-              <a:t>10/15/19</a:t>
+              <a:t>10/11/21</a:t>
             </a:fld>
             <a:endParaRPr lang="en-US"/>
           </a:p>
@@ -1714,7 +1714,7 @@
           <a:p>
             <a:fld id="{5D7A1F8C-62F5-5C43-8A5F-0B140731EF0C}" type="datetimeFigureOut">
               <a:rPr lang="en-US" smtClean="0"/>
-              <a:t>10/15/19</a:t>
+              <a:t>10/11/21</a:t>
             </a:fld>
             <a:endParaRPr lang="en-US"/>
           </a:p>
@@ -1809,7 +1809,7 @@
           <a:p>
             <a:fld id="{5D7A1F8C-62F5-5C43-8A5F-0B140731EF0C}" type="datetimeFigureOut">
               <a:rPr lang="en-US" smtClean="0"/>
-              <a:t>10/15/19</a:t>
+              <a:t>10/11/21</a:t>
             </a:fld>
             <a:endParaRPr lang="en-US"/>
           </a:p>
@@ -2084,7 +2084,7 @@
           <a:p>
             <a:fld id="{5D7A1F8C-62F5-5C43-8A5F-0B140731EF0C}" type="datetimeFigureOut">
               <a:rPr lang="en-US" smtClean="0"/>
-              <a:t>10/15/19</a:t>
+              <a:t>10/11/21</a:t>
             </a:fld>
             <a:endParaRPr lang="en-US"/>
           </a:p>
@@ -2336,7 +2336,7 @@
           <a:p>
             <a:fld id="{5D7A1F8C-62F5-5C43-8A5F-0B140731EF0C}" type="datetimeFigureOut">
               <a:rPr lang="en-US" smtClean="0"/>
-              <a:t>10/15/19</a:t>
+              <a:t>10/11/21</a:t>
             </a:fld>
             <a:endParaRPr lang="en-US"/>
           </a:p>
@@ -2547,7 +2547,7 @@
           <a:p>
             <a:fld id="{5D7A1F8C-62F5-5C43-8A5F-0B140731EF0C}" type="datetimeFigureOut">
               <a:rPr lang="en-US" smtClean="0"/>
-              <a:t>10/15/19</a:t>
+              <a:t>10/11/21</a:t>
             </a:fld>
             <a:endParaRPr lang="en-US"/>
           </a:p>
@@ -3062,7 +3062,7 @@
           <a:p>
             <a:r>
               <a:rPr lang="en-US" dirty="0"/>
-              <a:t>Make sure data are correct – should do alongside data wrangling</a:t>
+              <a:t>Make sure data are correct, especially after data wrangling</a:t>
             </a:r>
           </a:p>
           <a:p>

</xml_diff>